<commit_message>
Fixing silk screen and updating gerbers
</commit_message>
<xml_diff>
--- a/Knob Template.pptx
+++ b/Knob Template.pptx
@@ -3552,8 +3552,8 @@
             </p:nvSpPr>
             <p:spPr>
               <a:xfrm>
-                <a:off x="5365671" y="921403"/>
-                <a:ext cx="1460656" cy="1569660"/>
+                <a:off x="5053887" y="921403"/>
+                <a:ext cx="2084225" cy="1569660"/>
               </a:xfrm>
               <a:prstGeom prst="rect">
                 <a:avLst/>
@@ -3568,12 +3568,12 @@
               <a:p>
                 <a:pPr algn="ctr"/>
                 <a:r>
-                  <a:rPr lang="en-US" sz="9600" b="1">
+                  <a:rPr lang="en-US" sz="9600" b="1" dirty="0">
                     <a:solidFill>
                       <a:schemeClr val="bg1"/>
                     </a:solidFill>
                   </a:rPr>
-                  <a:t>C1</a:t>
+                  <a:t>C10</a:t>
                 </a:r>
                 <a:endParaRPr lang="en-US" b="1" dirty="0">
                   <a:solidFill>
@@ -3597,7 +3597,7 @@
             </p:nvSpPr>
             <p:spPr>
               <a:xfrm>
-                <a:off x="3571793" y="2945788"/>
+                <a:off x="7599000" y="2932534"/>
                 <a:ext cx="407660" cy="2215991"/>
               </a:xfrm>
               <a:prstGeom prst="rect">
@@ -3641,7 +3641,7 @@
             </p:nvSpPr>
             <p:spPr>
               <a:xfrm>
-                <a:off x="7637176" y="2463176"/>
+                <a:off x="3619953" y="2423419"/>
                 <a:ext cx="782471" cy="3154710"/>
               </a:xfrm>
               <a:prstGeom prst="rect">

</xml_diff>